<commit_message>
Add WaCore.Data.Ef_layers.png to docu
</commit_message>
<xml_diff>
--- a/docs/Layers.pptx
+++ b/docs/Layers.pptx
@@ -106,6 +106,11 @@
       </a:defRPr>
     </a:lvl9pPr>
   </p:defaultTextStyle>
+  <p:extLst>
+    <p:ext uri="{EFAFB233-063F-42B5-8137-9DF3F51BA10A}">
+      <p15:sldGuideLst xmlns:p15="http://schemas.microsoft.com/office/powerpoint/2012/main"/>
+    </p:ext>
+  </p:extLst>
 </p:presentation>
 </file>
 
@@ -3239,7 +3244,7 @@
         <a:p>
           <a:r>
             <a:rPr lang="en-AU" dirty="0" smtClean="0"/>
-            <a:t>Service Layer</a:t>
+            <a:t>Business Logic Layer</a:t>
           </a:r>
           <a:endParaRPr lang="en-US" dirty="0"/>
         </a:p>
@@ -3276,7 +3281,7 @@
         <a:p>
           <a:r>
             <a:rPr lang="en-AU" dirty="0" smtClean="0"/>
-            <a:t>Controller Layer</a:t>
+            <a:t>Presentation Layer</a:t>
           </a:r>
           <a:endParaRPr lang="en-US" dirty="0"/>
         </a:p>
@@ -3313,7 +3318,7 @@
         <a:p>
           <a:r>
             <a:rPr lang="en-AU" dirty="0" smtClean="0"/>
-            <a:t>Data Layer</a:t>
+            <a:t>Data Access Layer</a:t>
           </a:r>
           <a:endParaRPr lang="en-US" dirty="0"/>
         </a:p>
@@ -3352,6 +3357,13 @@
         </dgm:presLayoutVars>
       </dgm:prSet>
       <dgm:spPr/>
+      <dgm:t>
+        <a:bodyPr/>
+        <a:lstStyle/>
+        <a:p>
+          <a:endParaRPr lang="de-DE"/>
+        </a:p>
+      </dgm:t>
     </dgm:pt>
     <dgm:pt modelId="{A93541B1-CA32-4103-B395-C49268F87DC0}" type="pres">
       <dgm:prSet presAssocID="{39CF5425-2963-48EE-B352-AA62D3DC3826}" presName="vertOne" presStyleCnt="0"/>
@@ -3391,6 +3403,13 @@
         </dgm:presLayoutVars>
       </dgm:prSet>
       <dgm:spPr/>
+      <dgm:t>
+        <a:bodyPr/>
+        <a:lstStyle/>
+        <a:p>
+          <a:endParaRPr lang="de-DE"/>
+        </a:p>
+      </dgm:t>
     </dgm:pt>
     <dgm:pt modelId="{9B3C7148-ED56-4156-81EF-5769A2E6E9E9}" type="pres">
       <dgm:prSet presAssocID="{627A4BC4-97E5-46C8-B4C3-9364E085E64E}" presName="parTransOne" presStyleCnt="0"/>
@@ -3438,6 +3457,13 @@
         </dgm:presLayoutVars>
       </dgm:prSet>
       <dgm:spPr/>
+      <dgm:t>
+        <a:bodyPr/>
+        <a:lstStyle/>
+        <a:p>
+          <a:endParaRPr lang="de-DE"/>
+        </a:p>
+      </dgm:t>
     </dgm:pt>
     <dgm:pt modelId="{C3B6601C-52D6-4B2C-8BA8-E15431B87472}" type="pres">
       <dgm:prSet presAssocID="{92FB0BA6-3AB7-4F88-9576-48685F47C3D1}" presName="horzThree" presStyleCnt="0"/>
@@ -3445,15 +3471,15 @@
     </dgm:pt>
   </dgm:ptLst>
   <dgm:cxnLst>
+    <dgm:cxn modelId="{AB379F30-E626-41EF-85D0-07F818A7EFDE}" srcId="{627A4BC4-97E5-46C8-B4C3-9364E085E64E}" destId="{FEA77994-30AF-4AF4-9EAD-E03981F5E1A4}" srcOrd="0" destOrd="0" parTransId="{A76E2F71-265A-43A5-A221-68FE2E50800B}" sibTransId="{982CC22D-8B3A-4183-9243-BF570E07CFB8}"/>
+    <dgm:cxn modelId="{55746EBD-ABA3-4E08-A072-0ECF1E473873}" type="presOf" srcId="{C347B8B8-E2FE-4B5D-B3C6-EF5339C1045A}" destId="{AF3D45E6-27D3-4553-98DA-989FC55FEFC9}" srcOrd="0" destOrd="0" presId="urn:microsoft.com/office/officeart/2005/8/layout/architecture"/>
+    <dgm:cxn modelId="{1C7D6018-DA83-45A2-91FA-A9A7D900FB6E}" type="presOf" srcId="{627A4BC4-97E5-46C8-B4C3-9364E085E64E}" destId="{B740CAB7-BA10-47D7-9965-1483F3414CE0}" srcOrd="0" destOrd="0" presId="urn:microsoft.com/office/officeart/2005/8/layout/architecture"/>
+    <dgm:cxn modelId="{3D94EC85-4D7E-4EEC-AF1B-BADFF0AE5FCF}" srcId="{C347B8B8-E2FE-4B5D-B3C6-EF5339C1045A}" destId="{627A4BC4-97E5-46C8-B4C3-9364E085E64E}" srcOrd="1" destOrd="0" parTransId="{D8FE45F2-FD13-45F0-98F5-06926AA5FC15}" sibTransId="{802E546F-CD23-4603-BB61-A0250F133385}"/>
+    <dgm:cxn modelId="{26B4BC73-6FC9-4895-B54B-38EBCDA15897}" type="presOf" srcId="{FEA77994-30AF-4AF4-9EAD-E03981F5E1A4}" destId="{FE46D34C-DAAA-4844-9CC6-8BD798B1208E}" srcOrd="0" destOrd="0" presId="urn:microsoft.com/office/officeart/2005/8/layout/architecture"/>
     <dgm:cxn modelId="{164ACF40-A6EA-4351-8E86-4184F720FE4F}" srcId="{C347B8B8-E2FE-4B5D-B3C6-EF5339C1045A}" destId="{39CF5425-2963-48EE-B352-AA62D3DC3826}" srcOrd="0" destOrd="0" parTransId="{EDBFA49C-694A-4E18-8DD1-02836BE1CA69}" sibTransId="{4182E971-809E-4ABD-8F40-1F2231B04C4E}"/>
+    <dgm:cxn modelId="{9EB26866-1AAB-44CF-BC8E-5BF1F2C2B460}" srcId="{FEA77994-30AF-4AF4-9EAD-E03981F5E1A4}" destId="{92FB0BA6-3AB7-4F88-9576-48685F47C3D1}" srcOrd="0" destOrd="0" parTransId="{E56BB914-7ADE-4DA1-8D60-E6F6585FB19D}" sibTransId="{5D4648EE-3062-4356-89BB-0EA776A20525}"/>
     <dgm:cxn modelId="{887F8DFE-2952-42D5-8699-17825540A85E}" type="presOf" srcId="{92FB0BA6-3AB7-4F88-9576-48685F47C3D1}" destId="{B8F39245-322E-478B-91EE-EF264582758A}" srcOrd="0" destOrd="0" presId="urn:microsoft.com/office/officeart/2005/8/layout/architecture"/>
-    <dgm:cxn modelId="{26B4BC73-6FC9-4895-B54B-38EBCDA15897}" type="presOf" srcId="{FEA77994-30AF-4AF4-9EAD-E03981F5E1A4}" destId="{FE46D34C-DAAA-4844-9CC6-8BD798B1208E}" srcOrd="0" destOrd="0" presId="urn:microsoft.com/office/officeart/2005/8/layout/architecture"/>
-    <dgm:cxn modelId="{55746EBD-ABA3-4E08-A072-0ECF1E473873}" type="presOf" srcId="{C347B8B8-E2FE-4B5D-B3C6-EF5339C1045A}" destId="{AF3D45E6-27D3-4553-98DA-989FC55FEFC9}" srcOrd="0" destOrd="0" presId="urn:microsoft.com/office/officeart/2005/8/layout/architecture"/>
-    <dgm:cxn modelId="{3D94EC85-4D7E-4EEC-AF1B-BADFF0AE5FCF}" srcId="{C347B8B8-E2FE-4B5D-B3C6-EF5339C1045A}" destId="{627A4BC4-97E5-46C8-B4C3-9364E085E64E}" srcOrd="1" destOrd="0" parTransId="{D8FE45F2-FD13-45F0-98F5-06926AA5FC15}" sibTransId="{802E546F-CD23-4603-BB61-A0250F133385}"/>
-    <dgm:cxn modelId="{9EB26866-1AAB-44CF-BC8E-5BF1F2C2B460}" srcId="{FEA77994-30AF-4AF4-9EAD-E03981F5E1A4}" destId="{92FB0BA6-3AB7-4F88-9576-48685F47C3D1}" srcOrd="0" destOrd="0" parTransId="{E56BB914-7ADE-4DA1-8D60-E6F6585FB19D}" sibTransId="{5D4648EE-3062-4356-89BB-0EA776A20525}"/>
     <dgm:cxn modelId="{BE98588A-A7E2-41DA-8BC0-1E1E2FB90938}" type="presOf" srcId="{39CF5425-2963-48EE-B352-AA62D3DC3826}" destId="{EB2AA76C-EF63-4A23-AD34-56A39C6452E6}" srcOrd="0" destOrd="0" presId="urn:microsoft.com/office/officeart/2005/8/layout/architecture"/>
-    <dgm:cxn modelId="{1C7D6018-DA83-45A2-91FA-A9A7D900FB6E}" type="presOf" srcId="{627A4BC4-97E5-46C8-B4C3-9364E085E64E}" destId="{B740CAB7-BA10-47D7-9965-1483F3414CE0}" srcOrd="0" destOrd="0" presId="urn:microsoft.com/office/officeart/2005/8/layout/architecture"/>
-    <dgm:cxn modelId="{AB379F30-E626-41EF-85D0-07F818A7EFDE}" srcId="{627A4BC4-97E5-46C8-B4C3-9364E085E64E}" destId="{FEA77994-30AF-4AF4-9EAD-E03981F5E1A4}" srcOrd="0" destOrd="0" parTransId="{A76E2F71-265A-43A5-A221-68FE2E50800B}" sibTransId="{982CC22D-8B3A-4183-9243-BF570E07CFB8}"/>
     <dgm:cxn modelId="{B961C964-B282-46A9-8C6B-83C699043A01}" type="presParOf" srcId="{AF3D45E6-27D3-4553-98DA-989FC55FEFC9}" destId="{A93541B1-CA32-4103-B395-C49268F87DC0}" srcOrd="0" destOrd="0" presId="urn:microsoft.com/office/officeart/2005/8/layout/architecture"/>
     <dgm:cxn modelId="{470A0734-EF05-4096-823D-30B240E1581F}" type="presParOf" srcId="{A93541B1-CA32-4103-B395-C49268F87DC0}" destId="{EB2AA76C-EF63-4A23-AD34-56A39C6452E6}" srcOrd="0" destOrd="0" presId="urn:microsoft.com/office/officeart/2005/8/layout/architecture"/>
     <dgm:cxn modelId="{ED6FDFF2-386C-490F-BD52-41CC91391183}" type="presParOf" srcId="{A93541B1-CA32-4103-B395-C49268F87DC0}" destId="{469F1F23-E159-49FD-9659-CFB0712D739F}" srcOrd="1" destOrd="0" presId="urn:microsoft.com/office/officeart/2005/8/layout/architecture"/>
@@ -3684,6 +3710,13 @@
         </dgm:presLayoutVars>
       </dgm:prSet>
       <dgm:spPr/>
+      <dgm:t>
+        <a:bodyPr/>
+        <a:lstStyle/>
+        <a:p>
+          <a:endParaRPr lang="de-DE"/>
+        </a:p>
+      </dgm:t>
     </dgm:pt>
     <dgm:pt modelId="{A93541B1-CA32-4103-B395-C49268F87DC0}" type="pres">
       <dgm:prSet presAssocID="{39CF5425-2963-48EE-B352-AA62D3DC3826}" presName="vertOne" presStyleCnt="0"/>
@@ -3723,6 +3756,13 @@
         </dgm:presLayoutVars>
       </dgm:prSet>
       <dgm:spPr/>
+      <dgm:t>
+        <a:bodyPr/>
+        <a:lstStyle/>
+        <a:p>
+          <a:endParaRPr lang="de-DE"/>
+        </a:p>
+      </dgm:t>
     </dgm:pt>
     <dgm:pt modelId="{9B3C7148-ED56-4156-81EF-5769A2E6E9E9}" type="pres">
       <dgm:prSet presAssocID="{627A4BC4-97E5-46C8-B4C3-9364E085E64E}" presName="parTransOne" presStyleCnt="0"/>
@@ -3784,15 +3824,15 @@
     </dgm:pt>
   </dgm:ptLst>
   <dgm:cxnLst>
-    <dgm:cxn modelId="{BE98588A-A7E2-41DA-8BC0-1E1E2FB90938}" type="presOf" srcId="{39CF5425-2963-48EE-B352-AA62D3DC3826}" destId="{EB2AA76C-EF63-4A23-AD34-56A39C6452E6}" srcOrd="0" destOrd="0" presId="urn:microsoft.com/office/officeart/2005/8/layout/architecture"/>
     <dgm:cxn modelId="{AB379F30-E626-41EF-85D0-07F818A7EFDE}" srcId="{627A4BC4-97E5-46C8-B4C3-9364E085E64E}" destId="{FEA77994-30AF-4AF4-9EAD-E03981F5E1A4}" srcOrd="0" destOrd="0" parTransId="{A76E2F71-265A-43A5-A221-68FE2E50800B}" sibTransId="{982CC22D-8B3A-4183-9243-BF570E07CFB8}"/>
+    <dgm:cxn modelId="{55746EBD-ABA3-4E08-A072-0ECF1E473873}" type="presOf" srcId="{C347B8B8-E2FE-4B5D-B3C6-EF5339C1045A}" destId="{AF3D45E6-27D3-4553-98DA-989FC55FEFC9}" srcOrd="0" destOrd="0" presId="urn:microsoft.com/office/officeart/2005/8/layout/architecture"/>
+    <dgm:cxn modelId="{1C7D6018-DA83-45A2-91FA-A9A7D900FB6E}" type="presOf" srcId="{627A4BC4-97E5-46C8-B4C3-9364E085E64E}" destId="{B740CAB7-BA10-47D7-9965-1483F3414CE0}" srcOrd="0" destOrd="0" presId="urn:microsoft.com/office/officeart/2005/8/layout/architecture"/>
     <dgm:cxn modelId="{3D94EC85-4D7E-4EEC-AF1B-BADFF0AE5FCF}" srcId="{C347B8B8-E2FE-4B5D-B3C6-EF5339C1045A}" destId="{627A4BC4-97E5-46C8-B4C3-9364E085E64E}" srcOrd="1" destOrd="0" parTransId="{D8FE45F2-FD13-45F0-98F5-06926AA5FC15}" sibTransId="{802E546F-CD23-4603-BB61-A0250F133385}"/>
-    <dgm:cxn modelId="{9EB26866-1AAB-44CF-BC8E-5BF1F2C2B460}" srcId="{FEA77994-30AF-4AF4-9EAD-E03981F5E1A4}" destId="{92FB0BA6-3AB7-4F88-9576-48685F47C3D1}" srcOrd="0" destOrd="0" parTransId="{E56BB914-7ADE-4DA1-8D60-E6F6585FB19D}" sibTransId="{5D4648EE-3062-4356-89BB-0EA776A20525}"/>
-    <dgm:cxn modelId="{1C7D6018-DA83-45A2-91FA-A9A7D900FB6E}" type="presOf" srcId="{627A4BC4-97E5-46C8-B4C3-9364E085E64E}" destId="{B740CAB7-BA10-47D7-9965-1483F3414CE0}" srcOrd="0" destOrd="0" presId="urn:microsoft.com/office/officeart/2005/8/layout/architecture"/>
     <dgm:cxn modelId="{26B4BC73-6FC9-4895-B54B-38EBCDA15897}" type="presOf" srcId="{FEA77994-30AF-4AF4-9EAD-E03981F5E1A4}" destId="{FE46D34C-DAAA-4844-9CC6-8BD798B1208E}" srcOrd="0" destOrd="0" presId="urn:microsoft.com/office/officeart/2005/8/layout/architecture"/>
     <dgm:cxn modelId="{164ACF40-A6EA-4351-8E86-4184F720FE4F}" srcId="{C347B8B8-E2FE-4B5D-B3C6-EF5339C1045A}" destId="{39CF5425-2963-48EE-B352-AA62D3DC3826}" srcOrd="0" destOrd="0" parTransId="{EDBFA49C-694A-4E18-8DD1-02836BE1CA69}" sibTransId="{4182E971-809E-4ABD-8F40-1F2231B04C4E}"/>
-    <dgm:cxn modelId="{55746EBD-ABA3-4E08-A072-0ECF1E473873}" type="presOf" srcId="{C347B8B8-E2FE-4B5D-B3C6-EF5339C1045A}" destId="{AF3D45E6-27D3-4553-98DA-989FC55FEFC9}" srcOrd="0" destOrd="0" presId="urn:microsoft.com/office/officeart/2005/8/layout/architecture"/>
+    <dgm:cxn modelId="{9EB26866-1AAB-44CF-BC8E-5BF1F2C2B460}" srcId="{FEA77994-30AF-4AF4-9EAD-E03981F5E1A4}" destId="{92FB0BA6-3AB7-4F88-9576-48685F47C3D1}" srcOrd="0" destOrd="0" parTransId="{E56BB914-7ADE-4DA1-8D60-E6F6585FB19D}" sibTransId="{5D4648EE-3062-4356-89BB-0EA776A20525}"/>
     <dgm:cxn modelId="{887F8DFE-2952-42D5-8699-17825540A85E}" type="presOf" srcId="{92FB0BA6-3AB7-4F88-9576-48685F47C3D1}" destId="{B8F39245-322E-478B-91EE-EF264582758A}" srcOrd="0" destOrd="0" presId="urn:microsoft.com/office/officeart/2005/8/layout/architecture"/>
+    <dgm:cxn modelId="{BE98588A-A7E2-41DA-8BC0-1E1E2FB90938}" type="presOf" srcId="{39CF5425-2963-48EE-B352-AA62D3DC3826}" destId="{EB2AA76C-EF63-4A23-AD34-56A39C6452E6}" srcOrd="0" destOrd="0" presId="urn:microsoft.com/office/officeart/2005/8/layout/architecture"/>
     <dgm:cxn modelId="{B961C964-B282-46A9-8C6B-83C699043A01}" type="presParOf" srcId="{AF3D45E6-27D3-4553-98DA-989FC55FEFC9}" destId="{A93541B1-CA32-4103-B395-C49268F87DC0}" srcOrd="0" destOrd="0" presId="urn:microsoft.com/office/officeart/2005/8/layout/architecture"/>
     <dgm:cxn modelId="{470A0734-EF05-4096-823D-30B240E1581F}" type="presParOf" srcId="{A93541B1-CA32-4103-B395-C49268F87DC0}" destId="{EB2AA76C-EF63-4A23-AD34-56A39C6452E6}" srcOrd="0" destOrd="0" presId="urn:microsoft.com/office/officeart/2005/8/layout/architecture"/>
     <dgm:cxn modelId="{ED6FDFF2-386C-490F-BD52-41CC91391183}" type="presParOf" srcId="{A93541B1-CA32-4103-B395-C49268F87DC0}" destId="{469F1F23-E159-49FD-9659-CFB0712D739F}" srcOrd="1" destOrd="0" presId="urn:microsoft.com/office/officeart/2005/8/layout/architecture"/>
@@ -3891,7 +3931,7 @@
         <a:p>
           <a:r>
             <a:rPr lang="en-AU" dirty="0" smtClean="0"/>
-            <a:t>Service Layer</a:t>
+            <a:t>Business Logic Layer</a:t>
           </a:r>
           <a:endParaRPr lang="en-US" dirty="0"/>
         </a:p>
@@ -3928,7 +3968,7 @@
         <a:p>
           <a:r>
             <a:rPr lang="en-AU" dirty="0" smtClean="0"/>
-            <a:t>Controller Layer</a:t>
+            <a:t>Presentation Layer</a:t>
           </a:r>
           <a:endParaRPr lang="en-US" dirty="0"/>
         </a:p>
@@ -3965,7 +4005,7 @@
         <a:p>
           <a:r>
             <a:rPr lang="en-AU" dirty="0" smtClean="0"/>
-            <a:t>Data Layer</a:t>
+            <a:t>Data Access Layer</a:t>
           </a:r>
           <a:endParaRPr lang="en-US" dirty="0"/>
         </a:p>
@@ -4004,6 +4044,13 @@
         </dgm:presLayoutVars>
       </dgm:prSet>
       <dgm:spPr/>
+      <dgm:t>
+        <a:bodyPr/>
+        <a:lstStyle/>
+        <a:p>
+          <a:endParaRPr lang="de-DE"/>
+        </a:p>
+      </dgm:t>
     </dgm:pt>
     <dgm:pt modelId="{A93541B1-CA32-4103-B395-C49268F87DC0}" type="pres">
       <dgm:prSet presAssocID="{39CF5425-2963-48EE-B352-AA62D3DC3826}" presName="vertOne" presStyleCnt="0"/>
@@ -4043,6 +4090,13 @@
         </dgm:presLayoutVars>
       </dgm:prSet>
       <dgm:spPr/>
+      <dgm:t>
+        <a:bodyPr/>
+        <a:lstStyle/>
+        <a:p>
+          <a:endParaRPr lang="de-DE"/>
+        </a:p>
+      </dgm:t>
     </dgm:pt>
     <dgm:pt modelId="{9B3C7148-ED56-4156-81EF-5769A2E6E9E9}" type="pres">
       <dgm:prSet presAssocID="{627A4BC4-97E5-46C8-B4C3-9364E085E64E}" presName="parTransOne" presStyleCnt="0"/>
@@ -4090,6 +4144,13 @@
         </dgm:presLayoutVars>
       </dgm:prSet>
       <dgm:spPr/>
+      <dgm:t>
+        <a:bodyPr/>
+        <a:lstStyle/>
+        <a:p>
+          <a:endParaRPr lang="de-DE"/>
+        </a:p>
+      </dgm:t>
     </dgm:pt>
     <dgm:pt modelId="{C3B6601C-52D6-4B2C-8BA8-E15431B87472}" type="pres">
       <dgm:prSet presAssocID="{92FB0BA6-3AB7-4F88-9576-48685F47C3D1}" presName="horzThree" presStyleCnt="0"/>
@@ -4097,15 +4158,15 @@
     </dgm:pt>
   </dgm:ptLst>
   <dgm:cxnLst>
+    <dgm:cxn modelId="{AB379F30-E626-41EF-85D0-07F818A7EFDE}" srcId="{627A4BC4-97E5-46C8-B4C3-9364E085E64E}" destId="{FEA77994-30AF-4AF4-9EAD-E03981F5E1A4}" srcOrd="0" destOrd="0" parTransId="{A76E2F71-265A-43A5-A221-68FE2E50800B}" sibTransId="{982CC22D-8B3A-4183-9243-BF570E07CFB8}"/>
     <dgm:cxn modelId="{55746EBD-ABA3-4E08-A072-0ECF1E473873}" type="presOf" srcId="{C347B8B8-E2FE-4B5D-B3C6-EF5339C1045A}" destId="{AF3D45E6-27D3-4553-98DA-989FC55FEFC9}" srcOrd="0" destOrd="0" presId="urn:microsoft.com/office/officeart/2005/8/layout/architecture"/>
-    <dgm:cxn modelId="{9EB26866-1AAB-44CF-BC8E-5BF1F2C2B460}" srcId="{FEA77994-30AF-4AF4-9EAD-E03981F5E1A4}" destId="{92FB0BA6-3AB7-4F88-9576-48685F47C3D1}" srcOrd="0" destOrd="0" parTransId="{E56BB914-7ADE-4DA1-8D60-E6F6585FB19D}" sibTransId="{5D4648EE-3062-4356-89BB-0EA776A20525}"/>
     <dgm:cxn modelId="{1C7D6018-DA83-45A2-91FA-A9A7D900FB6E}" type="presOf" srcId="{627A4BC4-97E5-46C8-B4C3-9364E085E64E}" destId="{B740CAB7-BA10-47D7-9965-1483F3414CE0}" srcOrd="0" destOrd="0" presId="urn:microsoft.com/office/officeart/2005/8/layout/architecture"/>
-    <dgm:cxn modelId="{887F8DFE-2952-42D5-8699-17825540A85E}" type="presOf" srcId="{92FB0BA6-3AB7-4F88-9576-48685F47C3D1}" destId="{B8F39245-322E-478B-91EE-EF264582758A}" srcOrd="0" destOrd="0" presId="urn:microsoft.com/office/officeart/2005/8/layout/architecture"/>
-    <dgm:cxn modelId="{164ACF40-A6EA-4351-8E86-4184F720FE4F}" srcId="{C347B8B8-E2FE-4B5D-B3C6-EF5339C1045A}" destId="{39CF5425-2963-48EE-B352-AA62D3DC3826}" srcOrd="0" destOrd="0" parTransId="{EDBFA49C-694A-4E18-8DD1-02836BE1CA69}" sibTransId="{4182E971-809E-4ABD-8F40-1F2231B04C4E}"/>
-    <dgm:cxn modelId="{BE98588A-A7E2-41DA-8BC0-1E1E2FB90938}" type="presOf" srcId="{39CF5425-2963-48EE-B352-AA62D3DC3826}" destId="{EB2AA76C-EF63-4A23-AD34-56A39C6452E6}" srcOrd="0" destOrd="0" presId="urn:microsoft.com/office/officeart/2005/8/layout/architecture"/>
     <dgm:cxn modelId="{3D94EC85-4D7E-4EEC-AF1B-BADFF0AE5FCF}" srcId="{C347B8B8-E2FE-4B5D-B3C6-EF5339C1045A}" destId="{627A4BC4-97E5-46C8-B4C3-9364E085E64E}" srcOrd="1" destOrd="0" parTransId="{D8FE45F2-FD13-45F0-98F5-06926AA5FC15}" sibTransId="{802E546F-CD23-4603-BB61-A0250F133385}"/>
     <dgm:cxn modelId="{26B4BC73-6FC9-4895-B54B-38EBCDA15897}" type="presOf" srcId="{FEA77994-30AF-4AF4-9EAD-E03981F5E1A4}" destId="{FE46D34C-DAAA-4844-9CC6-8BD798B1208E}" srcOrd="0" destOrd="0" presId="urn:microsoft.com/office/officeart/2005/8/layout/architecture"/>
-    <dgm:cxn modelId="{AB379F30-E626-41EF-85D0-07F818A7EFDE}" srcId="{627A4BC4-97E5-46C8-B4C3-9364E085E64E}" destId="{FEA77994-30AF-4AF4-9EAD-E03981F5E1A4}" srcOrd="0" destOrd="0" parTransId="{A76E2F71-265A-43A5-A221-68FE2E50800B}" sibTransId="{982CC22D-8B3A-4183-9243-BF570E07CFB8}"/>
+    <dgm:cxn modelId="{164ACF40-A6EA-4351-8E86-4184F720FE4F}" srcId="{C347B8B8-E2FE-4B5D-B3C6-EF5339C1045A}" destId="{39CF5425-2963-48EE-B352-AA62D3DC3826}" srcOrd="0" destOrd="0" parTransId="{EDBFA49C-694A-4E18-8DD1-02836BE1CA69}" sibTransId="{4182E971-809E-4ABD-8F40-1F2231B04C4E}"/>
+    <dgm:cxn modelId="{9EB26866-1AAB-44CF-BC8E-5BF1F2C2B460}" srcId="{FEA77994-30AF-4AF4-9EAD-E03981F5E1A4}" destId="{92FB0BA6-3AB7-4F88-9576-48685F47C3D1}" srcOrd="0" destOrd="0" parTransId="{E56BB914-7ADE-4DA1-8D60-E6F6585FB19D}" sibTransId="{5D4648EE-3062-4356-89BB-0EA776A20525}"/>
+    <dgm:cxn modelId="{887F8DFE-2952-42D5-8699-17825540A85E}" type="presOf" srcId="{92FB0BA6-3AB7-4F88-9576-48685F47C3D1}" destId="{B8F39245-322E-478B-91EE-EF264582758A}" srcOrd="0" destOrd="0" presId="urn:microsoft.com/office/officeart/2005/8/layout/architecture"/>
+    <dgm:cxn modelId="{BE98588A-A7E2-41DA-8BC0-1E1E2FB90938}" type="presOf" srcId="{39CF5425-2963-48EE-B352-AA62D3DC3826}" destId="{EB2AA76C-EF63-4A23-AD34-56A39C6452E6}" srcOrd="0" destOrd="0" presId="urn:microsoft.com/office/officeart/2005/8/layout/architecture"/>
     <dgm:cxn modelId="{B961C964-B282-46A9-8C6B-83C699043A01}" type="presParOf" srcId="{AF3D45E6-27D3-4553-98DA-989FC55FEFC9}" destId="{A93541B1-CA32-4103-B395-C49268F87DC0}" srcOrd="0" destOrd="0" presId="urn:microsoft.com/office/officeart/2005/8/layout/architecture"/>
     <dgm:cxn modelId="{470A0734-EF05-4096-823D-30B240E1581F}" type="presParOf" srcId="{A93541B1-CA32-4103-B395-C49268F87DC0}" destId="{EB2AA76C-EF63-4A23-AD34-56A39C6452E6}" srcOrd="0" destOrd="0" presId="urn:microsoft.com/office/officeart/2005/8/layout/architecture"/>
     <dgm:cxn modelId="{ED6FDFF2-386C-490F-BD52-41CC91391183}" type="presParOf" srcId="{A93541B1-CA32-4103-B395-C49268F87DC0}" destId="{469F1F23-E159-49FD-9659-CFB0712D739F}" srcOrd="1" destOrd="0" presId="urn:microsoft.com/office/officeart/2005/8/layout/architecture"/>
@@ -4625,6 +4686,13 @@
         </dgm:presLayoutVars>
       </dgm:prSet>
       <dgm:spPr/>
+      <dgm:t>
+        <a:bodyPr/>
+        <a:lstStyle/>
+        <a:p>
+          <a:endParaRPr lang="de-DE"/>
+        </a:p>
+      </dgm:t>
     </dgm:pt>
     <dgm:pt modelId="{A93541B1-CA32-4103-B395-C49268F87DC0}" type="pres">
       <dgm:prSet presAssocID="{39CF5425-2963-48EE-B352-AA62D3DC3826}" presName="vertOne" presStyleCnt="0"/>
@@ -4772,6 +4840,13 @@
         </dgm:presLayoutVars>
       </dgm:prSet>
       <dgm:spPr/>
+      <dgm:t>
+        <a:bodyPr/>
+        <a:lstStyle/>
+        <a:p>
+          <a:endParaRPr lang="de-DE"/>
+        </a:p>
+      </dgm:t>
     </dgm:pt>
     <dgm:pt modelId="{32C27305-B6D2-43CB-B9AB-C770F8792B0F}" type="pres">
       <dgm:prSet presAssocID="{481C7316-D506-4C96-9492-A37A4688BCDF}" presName="parTransOne" presStyleCnt="0"/>
@@ -4819,6 +4894,13 @@
         </dgm:presLayoutVars>
       </dgm:prSet>
       <dgm:spPr/>
+      <dgm:t>
+        <a:bodyPr/>
+        <a:lstStyle/>
+        <a:p>
+          <a:endParaRPr lang="de-DE"/>
+        </a:p>
+      </dgm:t>
     </dgm:pt>
     <dgm:pt modelId="{08A169A5-879B-45D6-8284-4CD96AA43A1B}" type="pres">
       <dgm:prSet presAssocID="{4B53691C-50D6-4DFD-B8DE-1F55C81A6D7F}" presName="parTransThree" presStyleCnt="0"/>
@@ -4843,6 +4925,13 @@
         </dgm:presLayoutVars>
       </dgm:prSet>
       <dgm:spPr/>
+      <dgm:t>
+        <a:bodyPr/>
+        <a:lstStyle/>
+        <a:p>
+          <a:endParaRPr lang="de-DE"/>
+        </a:p>
+      </dgm:t>
     </dgm:pt>
     <dgm:pt modelId="{B1C0390F-6331-42DB-828C-251A605D616F}" type="pres">
       <dgm:prSet presAssocID="{CCA7FC31-E0B3-4899-98D5-1F47DD7AABD9}" presName="parTransFour" presStyleCnt="0"/>
@@ -4867,6 +4956,13 @@
         </dgm:presLayoutVars>
       </dgm:prSet>
       <dgm:spPr/>
+      <dgm:t>
+        <a:bodyPr/>
+        <a:lstStyle/>
+        <a:p>
+          <a:endParaRPr lang="de-DE"/>
+        </a:p>
+      </dgm:t>
     </dgm:pt>
     <dgm:pt modelId="{1DD00CD1-6107-4657-AB10-A71297201CC0}" type="pres">
       <dgm:prSet presAssocID="{04D8F607-C15B-40F7-A5E7-8A5C084D8979}" presName="parTransFour" presStyleCnt="0"/>
@@ -4891,6 +4987,13 @@
         </dgm:presLayoutVars>
       </dgm:prSet>
       <dgm:spPr/>
+      <dgm:t>
+        <a:bodyPr/>
+        <a:lstStyle/>
+        <a:p>
+          <a:endParaRPr lang="de-DE"/>
+        </a:p>
+      </dgm:t>
     </dgm:pt>
     <dgm:pt modelId="{7A5060DA-F8C6-49B5-94FA-6A617D0C3D5E}" type="pres">
       <dgm:prSet presAssocID="{BDB6B87F-2244-4E2D-BE00-2001417574D1}" presName="horzFour" presStyleCnt="0"/>
@@ -4899,28 +5002,28 @@
   </dgm:ptLst>
   <dgm:cxnLst>
     <dgm:cxn modelId="{FC4330EF-84C5-448D-83A8-FACDF7695D6D}" type="presOf" srcId="{9F8F9D59-13C6-4772-BDFB-B2F0271DE7EC}" destId="{E6CDFA64-8D24-4684-807A-7149670063AB}" srcOrd="0" destOrd="0" presId="urn:microsoft.com/office/officeart/2005/8/layout/architecture"/>
-    <dgm:cxn modelId="{55746EBD-ABA3-4E08-A072-0ECF1E473873}" type="presOf" srcId="{C347B8B8-E2FE-4B5D-B3C6-EF5339C1045A}" destId="{AF3D45E6-27D3-4553-98DA-989FC55FEFC9}" srcOrd="0" destOrd="0" presId="urn:microsoft.com/office/officeart/2005/8/layout/architecture"/>
-    <dgm:cxn modelId="{7EB9F85A-B103-49AA-B74A-A28E037DC3CA}" type="presOf" srcId="{0B02206A-A1A4-43A0-B27B-636362124CC0}" destId="{6C6DAB9E-370C-49EC-910B-08A28360E9E3}" srcOrd="0" destOrd="0" presId="urn:microsoft.com/office/officeart/2005/8/layout/architecture"/>
+    <dgm:cxn modelId="{48E3EB04-DDC9-4D49-80C2-824F6A11832A}" type="presOf" srcId="{481C7316-D506-4C96-9492-A37A4688BCDF}" destId="{8FB9265E-B9B2-4F33-A76A-46A979D441CC}" srcOrd="0" destOrd="0" presId="urn:microsoft.com/office/officeart/2005/8/layout/architecture"/>
+    <dgm:cxn modelId="{0A056400-F2D7-4F16-829D-1D255E808892}" srcId="{CCA7FC31-E0B3-4899-98D5-1F47DD7AABD9}" destId="{04D8F607-C15B-40F7-A5E7-8A5C084D8979}" srcOrd="0" destOrd="0" parTransId="{A453D55C-3CF3-415F-AF74-D1B6685E3959}" sibTransId="{9569B63D-0800-4A7F-BB30-D6A3D74BFDCC}"/>
+    <dgm:cxn modelId="{5EA98BA8-34DE-4020-811D-E7E7B91AE5CD}" type="presOf" srcId="{04D8F607-C15B-40F7-A5E7-8A5C084D8979}" destId="{43B0EAC0-B149-4AAC-95D3-78DC611C4429}" srcOrd="0" destOrd="0" presId="urn:microsoft.com/office/officeart/2005/8/layout/architecture"/>
+    <dgm:cxn modelId="{7A970895-C8BF-490F-BFAF-8686817126FB}" srcId="{481C7316-D506-4C96-9492-A37A4688BCDF}" destId="{0EEE066A-D6FB-410A-8E2F-6EB3853D78A1}" srcOrd="0" destOrd="0" parTransId="{2DB438B3-C35D-47D4-96BB-83D707184E1D}" sibTransId="{A3EA5E2E-5D41-4705-AC1B-2375A325A632}"/>
+    <dgm:cxn modelId="{0CD74918-3904-435E-B023-593CC7A9FC43}" type="presOf" srcId="{BDB6B87F-2244-4E2D-BE00-2001417574D1}" destId="{4CAD28E4-52CE-4245-AE76-CBBB7AD36DAD}" srcOrd="0" destOrd="0" presId="urn:microsoft.com/office/officeart/2005/8/layout/architecture"/>
+    <dgm:cxn modelId="{5C3B4F97-B4EA-4FB6-BA5F-9762B749A869}" type="presOf" srcId="{C0EAA340-2582-4E0B-9BEE-1F7E81D86BE1}" destId="{2DAA6AE6-3FED-449D-850E-74B42D431410}" srcOrd="0" destOrd="0" presId="urn:microsoft.com/office/officeart/2005/8/layout/architecture"/>
     <dgm:cxn modelId="{2113D508-6CBC-4DDB-8974-0440FC712ED0}" srcId="{74F8180A-1B11-470A-AAA2-24F800231EA6}" destId="{0B02206A-A1A4-43A0-B27B-636362124CC0}" srcOrd="0" destOrd="0" parTransId="{1F1490A3-CD50-47F5-9F3E-EA9CC1C4FB33}" sibTransId="{5B03A74B-CE31-463B-8CE2-3321DF71F75A}"/>
+    <dgm:cxn modelId="{019E5AE3-FA44-4860-AFD5-47E2E84DEA1D}" srcId="{0B02206A-A1A4-43A0-B27B-636362124CC0}" destId="{9F8F9D59-13C6-4772-BDFB-B2F0271DE7EC}" srcOrd="0" destOrd="0" parTransId="{A0802777-5AF1-4D61-B545-4F932AAD40E5}" sibTransId="{704EFA58-0604-4E2B-8057-709239552120}"/>
+    <dgm:cxn modelId="{0B58C27C-972D-4B53-9467-E1B0F388FC06}" srcId="{C347B8B8-E2FE-4B5D-B3C6-EF5339C1045A}" destId="{74F8180A-1B11-470A-AAA2-24F800231EA6}" srcOrd="2" destOrd="0" parTransId="{0108A4C8-6636-454C-BA2E-499DC6D55C78}" sibTransId="{C18F3E8A-0613-4D22-A0F3-3C756D9A1217}"/>
+    <dgm:cxn modelId="{FFA8F54F-657B-4A7A-BD28-D668A1A6D919}" type="presOf" srcId="{74F8180A-1B11-470A-AAA2-24F800231EA6}" destId="{685DB419-6CED-4235-BB01-2EC3C061ACAB}" srcOrd="0" destOrd="0" presId="urn:microsoft.com/office/officeart/2005/8/layout/architecture"/>
     <dgm:cxn modelId="{3AD7B93D-FA30-4923-9D70-FFB8A956D1ED}" srcId="{C347B8B8-E2FE-4B5D-B3C6-EF5339C1045A}" destId="{C0EAA340-2582-4E0B-9BEE-1F7E81D86BE1}" srcOrd="1" destOrd="0" parTransId="{683071D8-338E-4436-B1B4-644D8D119224}" sibTransId="{21ABD12C-C77C-4291-9A71-9C097C26E0DC}"/>
     <dgm:cxn modelId="{ED18F324-009A-4EE4-923B-30E01AA317A8}" srcId="{C347B8B8-E2FE-4B5D-B3C6-EF5339C1045A}" destId="{481C7316-D506-4C96-9492-A37A4688BCDF}" srcOrd="3" destOrd="0" parTransId="{A266EA9D-9468-4FA3-8201-0036D53DF7E7}" sibTransId="{6582D617-CA2D-46A0-A89A-89722A493E6B}"/>
-    <dgm:cxn modelId="{0CD74918-3904-435E-B023-593CC7A9FC43}" type="presOf" srcId="{BDB6B87F-2244-4E2D-BE00-2001417574D1}" destId="{4CAD28E4-52CE-4245-AE76-CBBB7AD36DAD}" srcOrd="0" destOrd="0" presId="urn:microsoft.com/office/officeart/2005/8/layout/architecture"/>
+    <dgm:cxn modelId="{81EC25FD-E8FF-492E-B418-0FF8D6323D8D}" srcId="{4B53691C-50D6-4DFD-B8DE-1F55C81A6D7F}" destId="{CCA7FC31-E0B3-4899-98D5-1F47DD7AABD9}" srcOrd="0" destOrd="0" parTransId="{2CAC8463-5835-428C-AED1-D68D923C1AAD}" sibTransId="{4E96331C-45CD-4312-8C1B-F5977921E1BA}"/>
+    <dgm:cxn modelId="{BE98588A-A7E2-41DA-8BC0-1E1E2FB90938}" type="presOf" srcId="{39CF5425-2963-48EE-B352-AA62D3DC3826}" destId="{EB2AA76C-EF63-4A23-AD34-56A39C6452E6}" srcOrd="0" destOrd="0" presId="urn:microsoft.com/office/officeart/2005/8/layout/architecture"/>
+    <dgm:cxn modelId="{9CD587D3-85B4-4438-AC2A-458283728142}" srcId="{04D8F607-C15B-40F7-A5E7-8A5C084D8979}" destId="{BDB6B87F-2244-4E2D-BE00-2001417574D1}" srcOrd="0" destOrd="0" parTransId="{6DE7F0EB-05DC-4C7D-B8A5-B53062531410}" sibTransId="{9EE7A664-B26D-408C-9561-603F0D32A724}"/>
+    <dgm:cxn modelId="{7EB9F85A-B103-49AA-B74A-A28E037DC3CA}" type="presOf" srcId="{0B02206A-A1A4-43A0-B27B-636362124CC0}" destId="{6C6DAB9E-370C-49EC-910B-08A28360E9E3}" srcOrd="0" destOrd="0" presId="urn:microsoft.com/office/officeart/2005/8/layout/architecture"/>
     <dgm:cxn modelId="{164ACF40-A6EA-4351-8E86-4184F720FE4F}" srcId="{C347B8B8-E2FE-4B5D-B3C6-EF5339C1045A}" destId="{39CF5425-2963-48EE-B352-AA62D3DC3826}" srcOrd="0" destOrd="0" parTransId="{EDBFA49C-694A-4E18-8DD1-02836BE1CA69}" sibTransId="{4182E971-809E-4ABD-8F40-1F2231B04C4E}"/>
-    <dgm:cxn modelId="{5C3B4F97-B4EA-4FB6-BA5F-9762B749A869}" type="presOf" srcId="{C0EAA340-2582-4E0B-9BEE-1F7E81D86BE1}" destId="{2DAA6AE6-3FED-449D-850E-74B42D431410}" srcOrd="0" destOrd="0" presId="urn:microsoft.com/office/officeart/2005/8/layout/architecture"/>
-    <dgm:cxn modelId="{FFA8F54F-657B-4A7A-BD28-D668A1A6D919}" type="presOf" srcId="{74F8180A-1B11-470A-AAA2-24F800231EA6}" destId="{685DB419-6CED-4235-BB01-2EC3C061ACAB}" srcOrd="0" destOrd="0" presId="urn:microsoft.com/office/officeart/2005/8/layout/architecture"/>
-    <dgm:cxn modelId="{019E5AE3-FA44-4860-AFD5-47E2E84DEA1D}" srcId="{0B02206A-A1A4-43A0-B27B-636362124CC0}" destId="{9F8F9D59-13C6-4772-BDFB-B2F0271DE7EC}" srcOrd="0" destOrd="0" parTransId="{A0802777-5AF1-4D61-B545-4F932AAD40E5}" sibTransId="{704EFA58-0604-4E2B-8057-709239552120}"/>
-    <dgm:cxn modelId="{48E3EB04-DDC9-4D49-80C2-824F6A11832A}" type="presOf" srcId="{481C7316-D506-4C96-9492-A37A4688BCDF}" destId="{8FB9265E-B9B2-4F33-A76A-46A979D441CC}" srcOrd="0" destOrd="0" presId="urn:microsoft.com/office/officeart/2005/8/layout/architecture"/>
+    <dgm:cxn modelId="{55746EBD-ABA3-4E08-A072-0ECF1E473873}" type="presOf" srcId="{C347B8B8-E2FE-4B5D-B3C6-EF5339C1045A}" destId="{AF3D45E6-27D3-4553-98DA-989FC55FEFC9}" srcOrd="0" destOrd="0" presId="urn:microsoft.com/office/officeart/2005/8/layout/architecture"/>
+    <dgm:cxn modelId="{348973BC-C334-431A-A3B0-58DFE95B7FFA}" srcId="{0EEE066A-D6FB-410A-8E2F-6EB3853D78A1}" destId="{4B53691C-50D6-4DFD-B8DE-1F55C81A6D7F}" srcOrd="0" destOrd="0" parTransId="{16852E31-ED6A-411B-A6A5-0FAAB96F693A}" sibTransId="{033D401D-B287-45D1-B0BA-0A159C1A47BE}"/>
+    <dgm:cxn modelId="{78133DD0-B858-4238-A2F8-083BC11B0C1E}" type="presOf" srcId="{0EEE066A-D6FB-410A-8E2F-6EB3853D78A1}" destId="{4B162A1E-A6EC-43CB-BCE0-5FFF36B1CB3C}" srcOrd="0" destOrd="0" presId="urn:microsoft.com/office/officeart/2005/8/layout/architecture"/>
     <dgm:cxn modelId="{D1743736-F4AF-4E8B-8A0A-B2CCBF722C34}" type="presOf" srcId="{CCA7FC31-E0B3-4899-98D5-1F47DD7AABD9}" destId="{8E6590A5-FD2C-4289-8E6B-3088EDFB29C8}" srcOrd="0" destOrd="0" presId="urn:microsoft.com/office/officeart/2005/8/layout/architecture"/>
     <dgm:cxn modelId="{97D2365A-C0F6-42A8-81E9-06E13A841AEE}" type="presOf" srcId="{4B53691C-50D6-4DFD-B8DE-1F55C81A6D7F}" destId="{C75F0D5C-3AF6-4A92-9941-C6E35A3F8488}" srcOrd="0" destOrd="0" presId="urn:microsoft.com/office/officeart/2005/8/layout/architecture"/>
-    <dgm:cxn modelId="{7A970895-C8BF-490F-BFAF-8686817126FB}" srcId="{481C7316-D506-4C96-9492-A37A4688BCDF}" destId="{0EEE066A-D6FB-410A-8E2F-6EB3853D78A1}" srcOrd="0" destOrd="0" parTransId="{2DB438B3-C35D-47D4-96BB-83D707184E1D}" sibTransId="{A3EA5E2E-5D41-4705-AC1B-2375A325A632}"/>
-    <dgm:cxn modelId="{348973BC-C334-431A-A3B0-58DFE95B7FFA}" srcId="{0EEE066A-D6FB-410A-8E2F-6EB3853D78A1}" destId="{4B53691C-50D6-4DFD-B8DE-1F55C81A6D7F}" srcOrd="0" destOrd="0" parTransId="{16852E31-ED6A-411B-A6A5-0FAAB96F693A}" sibTransId="{033D401D-B287-45D1-B0BA-0A159C1A47BE}"/>
-    <dgm:cxn modelId="{5EA98BA8-34DE-4020-811D-E7E7B91AE5CD}" type="presOf" srcId="{04D8F607-C15B-40F7-A5E7-8A5C084D8979}" destId="{43B0EAC0-B149-4AAC-95D3-78DC611C4429}" srcOrd="0" destOrd="0" presId="urn:microsoft.com/office/officeart/2005/8/layout/architecture"/>
-    <dgm:cxn modelId="{0B58C27C-972D-4B53-9467-E1B0F388FC06}" srcId="{C347B8B8-E2FE-4B5D-B3C6-EF5339C1045A}" destId="{74F8180A-1B11-470A-AAA2-24F800231EA6}" srcOrd="2" destOrd="0" parTransId="{0108A4C8-6636-454C-BA2E-499DC6D55C78}" sibTransId="{C18F3E8A-0613-4D22-A0F3-3C756D9A1217}"/>
-    <dgm:cxn modelId="{0A056400-F2D7-4F16-829D-1D255E808892}" srcId="{CCA7FC31-E0B3-4899-98D5-1F47DD7AABD9}" destId="{04D8F607-C15B-40F7-A5E7-8A5C084D8979}" srcOrd="0" destOrd="0" parTransId="{A453D55C-3CF3-415F-AF74-D1B6685E3959}" sibTransId="{9569B63D-0800-4A7F-BB30-D6A3D74BFDCC}"/>
-    <dgm:cxn modelId="{78133DD0-B858-4238-A2F8-083BC11B0C1E}" type="presOf" srcId="{0EEE066A-D6FB-410A-8E2F-6EB3853D78A1}" destId="{4B162A1E-A6EC-43CB-BCE0-5FFF36B1CB3C}" srcOrd="0" destOrd="0" presId="urn:microsoft.com/office/officeart/2005/8/layout/architecture"/>
-    <dgm:cxn modelId="{9CD587D3-85B4-4438-AC2A-458283728142}" srcId="{04D8F607-C15B-40F7-A5E7-8A5C084D8979}" destId="{BDB6B87F-2244-4E2D-BE00-2001417574D1}" srcOrd="0" destOrd="0" parTransId="{6DE7F0EB-05DC-4C7D-B8A5-B53062531410}" sibTransId="{9EE7A664-B26D-408C-9561-603F0D32A724}"/>
-    <dgm:cxn modelId="{BE98588A-A7E2-41DA-8BC0-1E1E2FB90938}" type="presOf" srcId="{39CF5425-2963-48EE-B352-AA62D3DC3826}" destId="{EB2AA76C-EF63-4A23-AD34-56A39C6452E6}" srcOrd="0" destOrd="0" presId="urn:microsoft.com/office/officeart/2005/8/layout/architecture"/>
-    <dgm:cxn modelId="{81EC25FD-E8FF-492E-B418-0FF8D6323D8D}" srcId="{4B53691C-50D6-4DFD-B8DE-1F55C81A6D7F}" destId="{CCA7FC31-E0B3-4899-98D5-1F47DD7AABD9}" srcOrd="0" destOrd="0" parTransId="{2CAC8463-5835-428C-AED1-D68D923C1AAD}" sibTransId="{4E96331C-45CD-4312-8C1B-F5977921E1BA}"/>
     <dgm:cxn modelId="{B961C964-B282-46A9-8C6B-83C699043A01}" type="presParOf" srcId="{AF3D45E6-27D3-4553-98DA-989FC55FEFC9}" destId="{A93541B1-CA32-4103-B395-C49268F87DC0}" srcOrd="0" destOrd="0" presId="urn:microsoft.com/office/officeart/2005/8/layout/architecture"/>
     <dgm:cxn modelId="{470A0734-EF05-4096-823D-30B240E1581F}" type="presParOf" srcId="{A93541B1-CA32-4103-B395-C49268F87DC0}" destId="{EB2AA76C-EF63-4A23-AD34-56A39C6452E6}" srcOrd="0" destOrd="0" presId="urn:microsoft.com/office/officeart/2005/8/layout/architecture"/>
     <dgm:cxn modelId="{ED6FDFF2-386C-490F-BD52-41CC91391183}" type="presParOf" srcId="{A93541B1-CA32-4103-B395-C49268F87DC0}" destId="{469F1F23-E159-49FD-9659-CFB0712D739F}" srcOrd="1" destOrd="0" presId="urn:microsoft.com/office/officeart/2005/8/layout/architecture"/>
@@ -5205,7 +5308,7 @@
           </a:pPr>
           <a:r>
             <a:rPr lang="en-AU" sz="2600" kern="1200" dirty="0" smtClean="0"/>
-            <a:t>Data Layer</a:t>
+            <a:t>Data Access Layer</a:t>
           </a:r>
           <a:endParaRPr lang="en-US" sz="2600" kern="1200" dirty="0"/>
         </a:p>
@@ -5315,7 +5418,7 @@
           </a:pPr>
           <a:r>
             <a:rPr lang="en-AU" sz="2600" kern="1200" dirty="0" smtClean="0"/>
-            <a:t>Service Layer</a:t>
+            <a:t>Business Logic Layer</a:t>
           </a:r>
           <a:endParaRPr lang="en-US" sz="2600" kern="1200" dirty="0"/>
         </a:p>
@@ -5425,7 +5528,7 @@
           </a:pPr>
           <a:r>
             <a:rPr lang="en-AU" sz="2600" kern="1200" dirty="0" smtClean="0"/>
-            <a:t>Controller Layer</a:t>
+            <a:t>Presentation Layer</a:t>
           </a:r>
           <a:endParaRPr lang="en-US" sz="2600" kern="1200" dirty="0"/>
         </a:p>
@@ -5981,7 +6084,7 @@
           </a:pPr>
           <a:r>
             <a:rPr lang="en-AU" sz="2600" kern="1200" dirty="0" smtClean="0"/>
-            <a:t>Data Layer</a:t>
+            <a:t>Data Access Layer</a:t>
           </a:r>
           <a:endParaRPr lang="en-US" sz="2600" kern="1200" dirty="0"/>
         </a:p>
@@ -6091,7 +6194,7 @@
           </a:pPr>
           <a:r>
             <a:rPr lang="en-AU" sz="2600" kern="1200" dirty="0" smtClean="0"/>
-            <a:t>Service Layer</a:t>
+            <a:t>Business Logic Layer</a:t>
           </a:r>
           <a:endParaRPr lang="en-US" sz="2600" kern="1200" dirty="0"/>
         </a:p>
@@ -6201,7 +6304,7 @@
           </a:pPr>
           <a:r>
             <a:rPr lang="en-AU" sz="2600" kern="1200" dirty="0" smtClean="0"/>
-            <a:t>Controller Layer</a:t>
+            <a:t>Presentation Layer</a:t>
           </a:r>
           <a:endParaRPr lang="en-US" sz="2600" kern="1200" dirty="0"/>
         </a:p>
@@ -14336,7 +14439,7 @@
           <a:p>
             <a:fld id="{48650E34-9030-4448-BDC2-750052A41D8F}" type="datetimeFigureOut">
               <a:rPr lang="en-US" smtClean="0"/>
-              <a:t>10/8/2017</a:t>
+              <a:t>10/23/2017</a:t>
             </a:fld>
             <a:endParaRPr lang="en-US"/>
           </a:p>
@@ -14378,7 +14481,7 @@
           <a:p>
             <a:fld id="{7590793B-8392-4750-B128-33F33AD4C722}" type="slidenum">
               <a:rPr lang="en-US" smtClean="0"/>
-              <a:t>‹#›</a:t>
+              <a:t>‹Nr.›</a:t>
             </a:fld>
             <a:endParaRPr lang="en-US"/>
           </a:p>
@@ -14506,7 +14609,7 @@
           <a:p>
             <a:fld id="{48650E34-9030-4448-BDC2-750052A41D8F}" type="datetimeFigureOut">
               <a:rPr lang="en-US" smtClean="0"/>
-              <a:t>10/8/2017</a:t>
+              <a:t>10/23/2017</a:t>
             </a:fld>
             <a:endParaRPr lang="en-US"/>
           </a:p>
@@ -14548,7 +14651,7 @@
           <a:p>
             <a:fld id="{7590793B-8392-4750-B128-33F33AD4C722}" type="slidenum">
               <a:rPr lang="en-US" smtClean="0"/>
-              <a:t>‹#›</a:t>
+              <a:t>‹Nr.›</a:t>
             </a:fld>
             <a:endParaRPr lang="en-US"/>
           </a:p>
@@ -14686,7 +14789,7 @@
           <a:p>
             <a:fld id="{48650E34-9030-4448-BDC2-750052A41D8F}" type="datetimeFigureOut">
               <a:rPr lang="en-US" smtClean="0"/>
-              <a:t>10/8/2017</a:t>
+              <a:t>10/23/2017</a:t>
             </a:fld>
             <a:endParaRPr lang="en-US"/>
           </a:p>
@@ -14728,7 +14831,7 @@
           <a:p>
             <a:fld id="{7590793B-8392-4750-B128-33F33AD4C722}" type="slidenum">
               <a:rPr lang="en-US" smtClean="0"/>
-              <a:t>‹#›</a:t>
+              <a:t>‹Nr.›</a:t>
             </a:fld>
             <a:endParaRPr lang="en-US"/>
           </a:p>
@@ -14856,7 +14959,7 @@
           <a:p>
             <a:fld id="{48650E34-9030-4448-BDC2-750052A41D8F}" type="datetimeFigureOut">
               <a:rPr lang="en-US" smtClean="0"/>
-              <a:t>10/8/2017</a:t>
+              <a:t>10/23/2017</a:t>
             </a:fld>
             <a:endParaRPr lang="en-US"/>
           </a:p>
@@ -14898,7 +15001,7 @@
           <a:p>
             <a:fld id="{7590793B-8392-4750-B128-33F33AD4C722}" type="slidenum">
               <a:rPr lang="en-US" smtClean="0"/>
-              <a:t>‹#›</a:t>
+              <a:t>‹Nr.›</a:t>
             </a:fld>
             <a:endParaRPr lang="en-US"/>
           </a:p>
@@ -15102,7 +15205,7 @@
           <a:p>
             <a:fld id="{48650E34-9030-4448-BDC2-750052A41D8F}" type="datetimeFigureOut">
               <a:rPr lang="en-US" smtClean="0"/>
-              <a:t>10/8/2017</a:t>
+              <a:t>10/23/2017</a:t>
             </a:fld>
             <a:endParaRPr lang="en-US"/>
           </a:p>
@@ -15144,7 +15247,7 @@
           <a:p>
             <a:fld id="{7590793B-8392-4750-B128-33F33AD4C722}" type="slidenum">
               <a:rPr lang="en-US" smtClean="0"/>
-              <a:t>‹#›</a:t>
+              <a:t>‹Nr.›</a:t>
             </a:fld>
             <a:endParaRPr lang="en-US"/>
           </a:p>
@@ -15334,7 +15437,7 @@
           <a:p>
             <a:fld id="{48650E34-9030-4448-BDC2-750052A41D8F}" type="datetimeFigureOut">
               <a:rPr lang="en-US" smtClean="0"/>
-              <a:t>10/8/2017</a:t>
+              <a:t>10/23/2017</a:t>
             </a:fld>
             <a:endParaRPr lang="en-US"/>
           </a:p>
@@ -15376,7 +15479,7 @@
           <a:p>
             <a:fld id="{7590793B-8392-4750-B128-33F33AD4C722}" type="slidenum">
               <a:rPr lang="en-US" smtClean="0"/>
-              <a:t>‹#›</a:t>
+              <a:t>‹Nr.›</a:t>
             </a:fld>
             <a:endParaRPr lang="en-US"/>
           </a:p>
@@ -15701,7 +15804,7 @@
           <a:p>
             <a:fld id="{48650E34-9030-4448-BDC2-750052A41D8F}" type="datetimeFigureOut">
               <a:rPr lang="en-US" smtClean="0"/>
-              <a:t>10/8/2017</a:t>
+              <a:t>10/23/2017</a:t>
             </a:fld>
             <a:endParaRPr lang="en-US"/>
           </a:p>
@@ -15743,7 +15846,7 @@
           <a:p>
             <a:fld id="{7590793B-8392-4750-B128-33F33AD4C722}" type="slidenum">
               <a:rPr lang="en-US" smtClean="0"/>
-              <a:t>‹#›</a:t>
+              <a:t>‹Nr.›</a:t>
             </a:fld>
             <a:endParaRPr lang="en-US"/>
           </a:p>
@@ -15819,7 +15922,7 @@
           <a:p>
             <a:fld id="{48650E34-9030-4448-BDC2-750052A41D8F}" type="datetimeFigureOut">
               <a:rPr lang="en-US" smtClean="0"/>
-              <a:t>10/8/2017</a:t>
+              <a:t>10/23/2017</a:t>
             </a:fld>
             <a:endParaRPr lang="en-US"/>
           </a:p>
@@ -15861,7 +15964,7 @@
           <a:p>
             <a:fld id="{7590793B-8392-4750-B128-33F33AD4C722}" type="slidenum">
               <a:rPr lang="en-US" smtClean="0"/>
-              <a:t>‹#›</a:t>
+              <a:t>‹Nr.›</a:t>
             </a:fld>
             <a:endParaRPr lang="en-US"/>
           </a:p>
@@ -15914,7 +16017,7 @@
           <a:p>
             <a:fld id="{48650E34-9030-4448-BDC2-750052A41D8F}" type="datetimeFigureOut">
               <a:rPr lang="en-US" smtClean="0"/>
-              <a:t>10/8/2017</a:t>
+              <a:t>10/23/2017</a:t>
             </a:fld>
             <a:endParaRPr lang="en-US"/>
           </a:p>
@@ -15956,7 +16059,7 @@
           <a:p>
             <a:fld id="{7590793B-8392-4750-B128-33F33AD4C722}" type="slidenum">
               <a:rPr lang="en-US" smtClean="0"/>
-              <a:t>‹#›</a:t>
+              <a:t>‹Nr.›</a:t>
             </a:fld>
             <a:endParaRPr lang="en-US"/>
           </a:p>
@@ -16191,7 +16294,7 @@
           <a:p>
             <a:fld id="{48650E34-9030-4448-BDC2-750052A41D8F}" type="datetimeFigureOut">
               <a:rPr lang="en-US" smtClean="0"/>
-              <a:t>10/8/2017</a:t>
+              <a:t>10/23/2017</a:t>
             </a:fld>
             <a:endParaRPr lang="en-US"/>
           </a:p>
@@ -16233,7 +16336,7 @@
           <a:p>
             <a:fld id="{7590793B-8392-4750-B128-33F33AD4C722}" type="slidenum">
               <a:rPr lang="en-US" smtClean="0"/>
-              <a:t>‹#›</a:t>
+              <a:t>‹Nr.›</a:t>
             </a:fld>
             <a:endParaRPr lang="en-US"/>
           </a:p>
@@ -16444,7 +16547,7 @@
           <a:p>
             <a:fld id="{48650E34-9030-4448-BDC2-750052A41D8F}" type="datetimeFigureOut">
               <a:rPr lang="en-US" smtClean="0"/>
-              <a:t>10/8/2017</a:t>
+              <a:t>10/23/2017</a:t>
             </a:fld>
             <a:endParaRPr lang="en-US"/>
           </a:p>
@@ -16486,7 +16589,7 @@
           <a:p>
             <a:fld id="{7590793B-8392-4750-B128-33F33AD4C722}" type="slidenum">
               <a:rPr lang="en-US" smtClean="0"/>
-              <a:t>‹#›</a:t>
+              <a:t>‹Nr.›</a:t>
             </a:fld>
             <a:endParaRPr lang="en-US"/>
           </a:p>
@@ -16657,7 +16760,7 @@
           <a:p>
             <a:fld id="{48650E34-9030-4448-BDC2-750052A41D8F}" type="datetimeFigureOut">
               <a:rPr lang="en-US" smtClean="0"/>
-              <a:t>10/8/2017</a:t>
+              <a:t>10/23/2017</a:t>
             </a:fld>
             <a:endParaRPr lang="en-US"/>
           </a:p>
@@ -16735,7 +16838,7 @@
           <a:p>
             <a:fld id="{7590793B-8392-4750-B128-33F33AD4C722}" type="slidenum">
               <a:rPr lang="en-US" smtClean="0"/>
-              <a:t>‹#›</a:t>
+              <a:t>‹Nr.›</a:t>
             </a:fld>
             <a:endParaRPr lang="en-US"/>
           </a:p>
@@ -17130,36 +17233,82 @@
           <a:chExt cx="0" cy="0"/>
         </a:xfrm>
       </p:grpSpPr>
-      <p:sp>
-        <p:nvSpPr>
-          <p:cNvPr id="2" name="Title 1"/>
-          <p:cNvSpPr>
-            <a:spLocks noGrp="1"/>
-          </p:cNvSpPr>
-          <p:nvPr>
-            <p:ph type="title"/>
-          </p:nvPr>
-        </p:nvSpPr>
+      <p:cxnSp>
+        <p:nvCxnSpPr>
+          <p:cNvPr id="15" name="Gerader Verbinder 14"/>
+          <p:cNvCxnSpPr/>
+          <p:nvPr/>
+        </p:nvCxnSpPr>
         <p:spPr>
-          <a:xfrm>
-            <a:off x="838200" y="347197"/>
-            <a:ext cx="10515600" cy="537322"/>
+          <a:xfrm flipV="1">
+            <a:off x="440267" y="4063999"/>
+            <a:ext cx="9271000" cy="8467"/>
           </a:xfrm>
+          <a:prstGeom prst="line">
+            <a:avLst/>
+          </a:prstGeom>
+          <a:ln w="9525">
+            <a:solidFill>
+              <a:schemeClr val="bg1">
+                <a:lumMod val="50000"/>
+              </a:schemeClr>
+            </a:solidFill>
+            <a:prstDash val="dash"/>
+          </a:ln>
         </p:spPr>
-        <p:txBody>
-          <a:bodyPr>
-            <a:normAutofit fontScale="90000"/>
-          </a:bodyPr>
-          <a:lstStyle/>
-          <a:p>
-            <a:r>
-              <a:rPr lang="en-AU" dirty="0" err="1" smtClean="0"/>
-              <a:t>WaCore.Data.Ef</a:t>
-            </a:r>
-            <a:endParaRPr lang="en-US" dirty="0"/>
-          </a:p>
-        </p:txBody>
-      </p:sp>
+        <p:style>
+          <a:lnRef idx="1">
+            <a:schemeClr val="accent1"/>
+          </a:lnRef>
+          <a:fillRef idx="0">
+            <a:schemeClr val="accent1"/>
+          </a:fillRef>
+          <a:effectRef idx="0">
+            <a:schemeClr val="accent1"/>
+          </a:effectRef>
+          <a:fontRef idx="minor">
+            <a:schemeClr val="tx1"/>
+          </a:fontRef>
+        </p:style>
+      </p:cxnSp>
+      <p:cxnSp>
+        <p:nvCxnSpPr>
+          <p:cNvPr id="5" name="Gerader Verbinder 4"/>
+          <p:cNvCxnSpPr/>
+          <p:nvPr/>
+        </p:nvCxnSpPr>
+        <p:spPr>
+          <a:xfrm flipV="1">
+            <a:off x="440267" y="2548467"/>
+            <a:ext cx="9271000" cy="8467"/>
+          </a:xfrm>
+          <a:prstGeom prst="line">
+            <a:avLst/>
+          </a:prstGeom>
+          <a:ln w="9525">
+            <a:solidFill>
+              <a:schemeClr val="bg1">
+                <a:lumMod val="50000"/>
+              </a:schemeClr>
+            </a:solidFill>
+            <a:prstDash val="dash"/>
+          </a:ln>
+        </p:spPr>
+        <p:style>
+          <a:lnRef idx="1">
+            <a:schemeClr val="accent1"/>
+          </a:lnRef>
+          <a:fillRef idx="0">
+            <a:schemeClr val="accent1"/>
+          </a:fillRef>
+          <a:effectRef idx="0">
+            <a:schemeClr val="accent1"/>
+          </a:effectRef>
+          <a:fontRef idx="minor">
+            <a:schemeClr val="tx1"/>
+          </a:fontRef>
+        </p:style>
+      </p:cxnSp>
       <p:graphicFrame>
         <p:nvGraphicFramePr>
           <p:cNvPr id="4" name="Content Placeholder 3"/>
@@ -17170,7 +17319,7 @@
             <p:ph idx="1"/>
             <p:extLst>
               <p:ext uri="{D42A27DB-BD31-4B8C-83A1-F6EECF244321}">
-                <p14:modId xmlns:p14="http://schemas.microsoft.com/office/powerpoint/2010/main" val="1250557585"/>
+                <p14:modId xmlns:p14="http://schemas.microsoft.com/office/powerpoint/2010/main" val="550018047"/>
               </p:ext>
             </p:extLst>
           </p:nvPr>
@@ -17550,36 +17699,82 @@
           <a:chExt cx="0" cy="0"/>
         </a:xfrm>
       </p:grpSpPr>
-      <p:sp>
-        <p:nvSpPr>
-          <p:cNvPr id="2" name="Title 1"/>
-          <p:cNvSpPr>
-            <a:spLocks noGrp="1"/>
-          </p:cNvSpPr>
-          <p:nvPr>
-            <p:ph type="title"/>
-          </p:nvPr>
-        </p:nvSpPr>
+      <p:cxnSp>
+        <p:nvCxnSpPr>
+          <p:cNvPr id="24" name="Gerader Verbinder 23"/>
+          <p:cNvCxnSpPr/>
+          <p:nvPr/>
+        </p:nvCxnSpPr>
         <p:spPr>
-          <a:xfrm>
-            <a:off x="838200" y="347197"/>
-            <a:ext cx="10515600" cy="537322"/>
+          <a:xfrm flipV="1">
+            <a:off x="516467" y="4113697"/>
+            <a:ext cx="9271000" cy="8467"/>
           </a:xfrm>
+          <a:prstGeom prst="line">
+            <a:avLst/>
+          </a:prstGeom>
+          <a:ln w="9525">
+            <a:solidFill>
+              <a:schemeClr val="bg1">
+                <a:lumMod val="50000"/>
+              </a:schemeClr>
+            </a:solidFill>
+            <a:prstDash val="dash"/>
+          </a:ln>
         </p:spPr>
-        <p:txBody>
-          <a:bodyPr>
-            <a:normAutofit fontScale="90000"/>
-          </a:bodyPr>
-          <a:lstStyle/>
-          <a:p>
-            <a:r>
-              <a:rPr lang="en-AU" dirty="0" err="1" smtClean="0"/>
-              <a:t>WaCore.Crud</a:t>
-            </a:r>
-            <a:endParaRPr lang="en-US" dirty="0"/>
-          </a:p>
-        </p:txBody>
-      </p:sp>
+        <p:style>
+          <a:lnRef idx="1">
+            <a:schemeClr val="accent1"/>
+          </a:lnRef>
+          <a:fillRef idx="0">
+            <a:schemeClr val="accent1"/>
+          </a:fillRef>
+          <a:effectRef idx="0">
+            <a:schemeClr val="accent1"/>
+          </a:effectRef>
+          <a:fontRef idx="minor">
+            <a:schemeClr val="tx1"/>
+          </a:fontRef>
+        </p:style>
+      </p:cxnSp>
+      <p:cxnSp>
+        <p:nvCxnSpPr>
+          <p:cNvPr id="23" name="Gerader Verbinder 22"/>
+          <p:cNvCxnSpPr/>
+          <p:nvPr/>
+        </p:nvCxnSpPr>
+        <p:spPr>
+          <a:xfrm flipV="1">
+            <a:off x="516467" y="2599266"/>
+            <a:ext cx="9271000" cy="8467"/>
+          </a:xfrm>
+          <a:prstGeom prst="line">
+            <a:avLst/>
+          </a:prstGeom>
+          <a:ln w="9525">
+            <a:solidFill>
+              <a:schemeClr val="bg1">
+                <a:lumMod val="50000"/>
+              </a:schemeClr>
+            </a:solidFill>
+            <a:prstDash val="dash"/>
+          </a:ln>
+        </p:spPr>
+        <p:style>
+          <a:lnRef idx="1">
+            <a:schemeClr val="accent1"/>
+          </a:lnRef>
+          <a:fillRef idx="0">
+            <a:schemeClr val="accent1"/>
+          </a:fillRef>
+          <a:effectRef idx="0">
+            <a:schemeClr val="accent1"/>
+          </a:effectRef>
+          <a:fontRef idx="minor">
+            <a:schemeClr val="tx1"/>
+          </a:fontRef>
+        </p:style>
+      </p:cxnSp>
       <p:graphicFrame>
         <p:nvGraphicFramePr>
           <p:cNvPr id="4" name="Content Placeholder 3"/>
@@ -17590,7 +17785,7 @@
             <p:ph idx="1"/>
             <p:extLst>
               <p:ext uri="{D42A27DB-BD31-4B8C-83A1-F6EECF244321}">
-                <p14:modId xmlns:p14="http://schemas.microsoft.com/office/powerpoint/2010/main" val="3780261593"/>
+                <p14:modId xmlns:p14="http://schemas.microsoft.com/office/powerpoint/2010/main" val="3323310486"/>
               </p:ext>
             </p:extLst>
           </p:nvPr>
@@ -17637,7 +17832,7 @@
         </p:nvGrpSpPr>
         <p:grpSpPr>
           <a:xfrm>
-            <a:off x="4720903" y="5862924"/>
+            <a:off x="3086835" y="5862924"/>
             <a:ext cx="371581" cy="357189"/>
             <a:chOff x="307" y="3023201"/>
             <a:chExt cx="2590375" cy="1326968"/>
@@ -17755,7 +17950,7 @@
         </p:nvSpPr>
         <p:spPr>
           <a:xfrm>
-            <a:off x="5043810" y="5873386"/>
+            <a:off x="3409742" y="5873386"/>
             <a:ext cx="1600887" cy="369332"/>
           </a:xfrm>
           <a:prstGeom prst="rect">
@@ -17789,7 +17984,7 @@
         </p:nvGrpSpPr>
         <p:grpSpPr>
           <a:xfrm>
-            <a:off x="4720903" y="6266328"/>
+            <a:off x="3086835" y="6266328"/>
             <a:ext cx="371581" cy="357189"/>
             <a:chOff x="307" y="3023201"/>
             <a:chExt cx="2590375" cy="1326968"/>
@@ -17911,8 +18106,8 @@
         </p:nvSpPr>
         <p:spPr>
           <a:xfrm>
-            <a:off x="5061746" y="6276790"/>
-            <a:ext cx="2157450" cy="369332"/>
+            <a:off x="3427678" y="6276790"/>
+            <a:ext cx="2893421" cy="369332"/>
           </a:xfrm>
           <a:prstGeom prst="rect">
             <a:avLst/>
@@ -17927,7 +18122,7 @@
           <a:p>
             <a:r>
               <a:rPr lang="en-AU" dirty="0" smtClean="0"/>
-              <a:t>Dependent assembly</a:t>
+              <a:t>Dependent assembly (direct)</a:t>
             </a:r>
             <a:endParaRPr lang="en-US" dirty="0"/>
           </a:p>
@@ -17941,7 +18136,7 @@
         </p:nvGrpSpPr>
         <p:grpSpPr>
           <a:xfrm>
-            <a:off x="7407717" y="5862924"/>
+            <a:off x="6476383" y="5862924"/>
             <a:ext cx="371581" cy="357189"/>
             <a:chOff x="307" y="3023201"/>
             <a:chExt cx="2590375" cy="1326968"/>
@@ -18063,8 +18258,8 @@
         </p:nvSpPr>
         <p:spPr>
           <a:xfrm>
-            <a:off x="7748560" y="5873386"/>
-            <a:ext cx="2317045" cy="369332"/>
+            <a:off x="6817226" y="5873386"/>
+            <a:ext cx="2712987" cy="369332"/>
           </a:xfrm>
           <a:prstGeom prst="rect">
             <a:avLst/>
@@ -18079,7 +18274,7 @@
           <a:p>
             <a:r>
               <a:rPr lang="en-AU" dirty="0" smtClean="0"/>
-              <a:t>Other Module (</a:t>
+              <a:t>Dependent </a:t>
             </a:r>
             <a:r>
               <a:rPr lang="en-AU" dirty="0" err="1" smtClean="0"/>
@@ -18087,7 +18282,7 @@
             </a:r>
             <a:r>
               <a:rPr lang="en-AU" dirty="0" smtClean="0"/>
-              <a:t>)</a:t>
+              <a:t> package</a:t>
             </a:r>
             <a:endParaRPr lang="en-US" dirty="0"/>
           </a:p>
@@ -18101,7 +18296,7 @@
         </p:nvGrpSpPr>
         <p:grpSpPr>
           <a:xfrm>
-            <a:off x="7410712" y="6266328"/>
+            <a:off x="6479378" y="6266328"/>
             <a:ext cx="371581" cy="357189"/>
             <a:chOff x="307" y="3023201"/>
             <a:chExt cx="2590375" cy="1326968"/>
@@ -18223,8 +18418,8 @@
         </p:nvSpPr>
         <p:spPr>
           <a:xfrm>
-            <a:off x="7751555" y="6276790"/>
-            <a:ext cx="3661067" cy="369332"/>
+            <a:off x="6820221" y="6276790"/>
+            <a:ext cx="3068148" cy="369332"/>
           </a:xfrm>
           <a:prstGeom prst="rect">
             <a:avLst/>
@@ -18239,7 +18434,7 @@
           <a:p>
             <a:r>
               <a:rPr lang="en-AU" dirty="0" smtClean="0"/>
-              <a:t>Other Module (dependent assembly)</a:t>
+              <a:t>Dependent assembly (indirect)</a:t>
             </a:r>
             <a:endParaRPr lang="en-US" dirty="0"/>
           </a:p>

</xml_diff>